<commit_message>
Actualización del Modelo Canvas
Se cambiaron diseños generales y se actualizaron los detalles de los diferentes componentes del modelo.
Versión: Semi-final.
</commit_message>
<xml_diff>
--- a/Canvas Model/canvas.pptx
+++ b/Canvas Model/canvas.pptx
@@ -113,6 +113,10 @@
 </p:presentation>
 </file>
 
+<file path=ppt/revisionInfo.xml><?xml version="1.0" encoding="utf-8"?>
+<p1510:revInfo xmlns:a="http://schemas.openxmlformats.org/drawingml/2006/main" xmlns:r="http://schemas.openxmlformats.org/officeDocument/2006/relationships" xmlns:p1510="http://schemas.microsoft.com/office/powerpoint/2015/10/main"/>
+</file>
+
 <file path=ppt/slideLayouts/slideLayout1.xml><?xml version="1.0" encoding="utf-8"?>
 <p:sldLayout xmlns:a="http://schemas.openxmlformats.org/drawingml/2006/main" xmlns:r="http://schemas.openxmlformats.org/officeDocument/2006/relationships" xmlns:p="http://schemas.openxmlformats.org/presentationml/2006/main" type="title" preserve="1">
   <p:cSld name="Title Slide">
@@ -316,7 +320,7 @@
           <a:p>
             <a:fld id="{D6E7FFEC-BAF1-4F3C-9376-9B3FCD7C0A2F}" type="slidenum">
               <a:rPr lang="es-MX" smtClean="0"/>
-              <a:t>‹#›</a:t>
+              <a:t>‹Nº›</a:t>
             </a:fld>
             <a:endParaRPr lang="es-MX"/>
           </a:p>
@@ -516,7 +520,7 @@
           <a:p>
             <a:fld id="{D6E7FFEC-BAF1-4F3C-9376-9B3FCD7C0A2F}" type="slidenum">
               <a:rPr lang="es-MX" smtClean="0"/>
-              <a:t>‹#›</a:t>
+              <a:t>‹Nº›</a:t>
             </a:fld>
             <a:endParaRPr lang="es-MX"/>
           </a:p>
@@ -726,7 +730,7 @@
           <a:p>
             <a:fld id="{D6E7FFEC-BAF1-4F3C-9376-9B3FCD7C0A2F}" type="slidenum">
               <a:rPr lang="es-MX" smtClean="0"/>
-              <a:t>‹#›</a:t>
+              <a:t>‹Nº›</a:t>
             </a:fld>
             <a:endParaRPr lang="es-MX"/>
           </a:p>
@@ -926,7 +930,7 @@
           <a:p>
             <a:fld id="{D6E7FFEC-BAF1-4F3C-9376-9B3FCD7C0A2F}" type="slidenum">
               <a:rPr lang="es-MX" smtClean="0"/>
-              <a:t>‹#›</a:t>
+              <a:t>‹Nº›</a:t>
             </a:fld>
             <a:endParaRPr lang="es-MX"/>
           </a:p>
@@ -1202,7 +1206,7 @@
           <a:p>
             <a:fld id="{D6E7FFEC-BAF1-4F3C-9376-9B3FCD7C0A2F}" type="slidenum">
               <a:rPr lang="es-MX" smtClean="0"/>
-              <a:t>‹#›</a:t>
+              <a:t>‹Nº›</a:t>
             </a:fld>
             <a:endParaRPr lang="es-MX"/>
           </a:p>
@@ -1470,7 +1474,7 @@
           <a:p>
             <a:fld id="{D6E7FFEC-BAF1-4F3C-9376-9B3FCD7C0A2F}" type="slidenum">
               <a:rPr lang="es-MX" smtClean="0"/>
-              <a:t>‹#›</a:t>
+              <a:t>‹Nº›</a:t>
             </a:fld>
             <a:endParaRPr lang="es-MX"/>
           </a:p>
@@ -1885,7 +1889,7 @@
           <a:p>
             <a:fld id="{D6E7FFEC-BAF1-4F3C-9376-9B3FCD7C0A2F}" type="slidenum">
               <a:rPr lang="es-MX" smtClean="0"/>
-              <a:t>‹#›</a:t>
+              <a:t>‹Nº›</a:t>
             </a:fld>
             <a:endParaRPr lang="es-MX"/>
           </a:p>
@@ -2027,7 +2031,7 @@
           <a:p>
             <a:fld id="{D6E7FFEC-BAF1-4F3C-9376-9B3FCD7C0A2F}" type="slidenum">
               <a:rPr lang="es-MX" smtClean="0"/>
-              <a:t>‹#›</a:t>
+              <a:t>‹Nº›</a:t>
             </a:fld>
             <a:endParaRPr lang="es-MX"/>
           </a:p>
@@ -2140,7 +2144,7 @@
           <a:p>
             <a:fld id="{D6E7FFEC-BAF1-4F3C-9376-9B3FCD7C0A2F}" type="slidenum">
               <a:rPr lang="es-MX" smtClean="0"/>
-              <a:t>‹#›</a:t>
+              <a:t>‹Nº›</a:t>
             </a:fld>
             <a:endParaRPr lang="es-MX"/>
           </a:p>
@@ -2453,7 +2457,7 @@
           <a:p>
             <a:fld id="{D6E7FFEC-BAF1-4F3C-9376-9B3FCD7C0A2F}" type="slidenum">
               <a:rPr lang="es-MX" smtClean="0"/>
-              <a:t>‹#›</a:t>
+              <a:t>‹Nº›</a:t>
             </a:fld>
             <a:endParaRPr lang="es-MX"/>
           </a:p>
@@ -2742,7 +2746,7 @@
           <a:p>
             <a:fld id="{D6E7FFEC-BAF1-4F3C-9376-9B3FCD7C0A2F}" type="slidenum">
               <a:rPr lang="es-MX" smtClean="0"/>
-              <a:t>‹#›</a:t>
+              <a:t>‹Nº›</a:t>
             </a:fld>
             <a:endParaRPr lang="es-MX"/>
           </a:p>
@@ -3021,7 +3025,7 @@
           <a:p>
             <a:fld id="{D6E7FFEC-BAF1-4F3C-9376-9B3FCD7C0A2F}" type="slidenum">
               <a:rPr lang="es-MX" smtClean="0"/>
-              <a:t>‹#›</a:t>
+              <a:t>‹Nº›</a:t>
             </a:fld>
             <a:endParaRPr lang="es-MX"/>
           </a:p>
@@ -3336,17 +3340,15 @@
   <p:cSld>
     <p:bg>
       <p:bgPr>
-        <a:pattFill prst="divot">
-          <a:fgClr>
-            <a:schemeClr val="accent1">
-              <a:lumMod val="20000"/>
-              <a:lumOff val="80000"/>
-            </a:schemeClr>
-          </a:fgClr>
-          <a:bgClr>
-            <a:schemeClr val="bg1"/>
-          </a:bgClr>
-        </a:pattFill>
+        <a:blipFill dpi="0" rotWithShape="1">
+          <a:blip r:embed="rId2">
+            <a:lum/>
+          </a:blip>
+          <a:srcRect/>
+          <a:stretch>
+            <a:fillRect l="-8000" r="-8000"/>
+          </a:stretch>
+        </a:blipFill>
         <a:effectLst/>
       </p:bgPr>
     </p:bg>
@@ -3379,7 +3381,7 @@
           <p:nvPr/>
         </p:nvPicPr>
         <p:blipFill>
-          <a:blip r:embed="rId2">
+          <a:blip r:embed="rId3">
             <a:extLst>
               <a:ext uri="{28A0092B-C50C-407E-A947-70E740481C1C}">
                 <a14:useLocalDpi xmlns:a14="http://schemas.microsoft.com/office/drawing/2010/main" val="0"/>
@@ -3393,8 +3395,8 @@
         </p:blipFill>
         <p:spPr bwMode="auto">
           <a:xfrm>
-            <a:off x="10304060" y="144154"/>
-            <a:ext cx="1710803" cy="1710803"/>
+            <a:off x="10539191" y="353162"/>
+            <a:ext cx="1440000" cy="1440000"/>
           </a:xfrm>
           <a:prstGeom prst="rect">
             <a:avLst/>
@@ -3425,14 +3427,27 @@
         </p:nvSpPr>
         <p:spPr>
           <a:xfrm>
-            <a:off x="3168555" y="4136912"/>
-            <a:ext cx="5854889" cy="400110"/>
+            <a:off x="4791208" y="4032052"/>
+            <a:ext cx="2609581" cy="400110"/>
           </a:xfrm>
           <a:prstGeom prst="rect">
             <a:avLst/>
           </a:prstGeom>
-          <a:noFill/>
-        </p:spPr>
+        </p:spPr>
+        <p:style>
+          <a:lnRef idx="3">
+            <a:schemeClr val="lt1"/>
+          </a:lnRef>
+          <a:fillRef idx="1">
+            <a:schemeClr val="accent2"/>
+          </a:fillRef>
+          <a:effectRef idx="1">
+            <a:schemeClr val="accent2"/>
+          </a:effectRef>
+          <a:fontRef idx="minor">
+            <a:schemeClr val="lt1"/>
+          </a:fontRef>
+        </p:style>
         <p:txBody>
           <a:bodyPr wrap="square" rtlCol="0">
             <a:spAutoFit/>
@@ -3444,115 +3459,99 @@
               <a:rPr lang="es-MX" sz="2000" dirty="0">
                 <a:latin typeface="Century Gothic" panose="020B0502020202020204" pitchFamily="34" charset="0"/>
               </a:rPr>
-              <a:t>Por Happy Pets</a:t>
-            </a:r>
-            <a:endParaRPr lang="en-US" sz="2000" dirty="0">
+              <a:t>Por </a:t>
+            </a:r>
+            <a:r>
+              <a:rPr lang="es-MX" sz="2000" dirty="0" err="1">
+                <a:latin typeface="Century Gothic" panose="020B0502020202020204" pitchFamily="34" charset="0"/>
+              </a:rPr>
+              <a:t>Happy</a:t>
+            </a:r>
+            <a:r>
+              <a:rPr lang="es-MX" sz="2000" dirty="0">
+                <a:latin typeface="Century Gothic" panose="020B0502020202020204" pitchFamily="34" charset="0"/>
+              </a:rPr>
+              <a:t> </a:t>
+            </a:r>
+            <a:r>
+              <a:rPr lang="es-MX" sz="2000" dirty="0" err="1">
+                <a:latin typeface="Century Gothic" panose="020B0502020202020204" pitchFamily="34" charset="0"/>
+              </a:rPr>
+              <a:t>Pets</a:t>
+            </a:r>
+            <a:r>
+              <a:rPr lang="es-MX" sz="2000" dirty="0">
+                <a:latin typeface="Century Gothic" panose="020B0502020202020204" pitchFamily="34" charset="0"/>
+              </a:rPr>
+              <a:t> ®</a:t>
+            </a:r>
+          </a:p>
+        </p:txBody>
+      </p:sp>
+      <p:sp>
+        <p:nvSpPr>
+          <p:cNvPr id="8" name="TextBox 7">
+            <a:extLst>
+              <a:ext uri="{FF2B5EF4-FFF2-40B4-BE49-F238E27FC236}">
+                <a16:creationId xmlns:a16="http://schemas.microsoft.com/office/drawing/2014/main" id="{8B7EA4C1-D5C6-409D-B24D-788007ABEBFD}"/>
+              </a:ext>
+            </a:extLst>
+          </p:cNvPr>
+          <p:cNvSpPr txBox="1"/>
+          <p:nvPr/>
+        </p:nvSpPr>
+        <p:spPr>
+          <a:xfrm>
+            <a:off x="3168555" y="1959675"/>
+            <a:ext cx="5854889" cy="1938992"/>
+          </a:xfrm>
+          <a:prstGeom prst="rect">
+            <a:avLst/>
+          </a:prstGeom>
+        </p:spPr>
+        <p:style>
+          <a:lnRef idx="2">
+            <a:schemeClr val="accent2"/>
+          </a:lnRef>
+          <a:fillRef idx="1">
+            <a:schemeClr val="lt1"/>
+          </a:fillRef>
+          <a:effectRef idx="0">
+            <a:schemeClr val="accent2"/>
+          </a:effectRef>
+          <a:fontRef idx="minor">
+            <a:schemeClr val="dk1"/>
+          </a:fontRef>
+        </p:style>
+        <p:txBody>
+          <a:bodyPr wrap="square" rtlCol="0">
+            <a:spAutoFit/>
+          </a:bodyPr>
+          <a:lstStyle/>
+          <a:p>
+            <a:pPr algn="ctr"/>
+            <a:r>
+              <a:rPr lang="es-MX" sz="4000" b="1" dirty="0">
+                <a:solidFill>
+                  <a:schemeClr val="bg2">
+                    <a:lumMod val="25000"/>
+                  </a:schemeClr>
+                </a:solidFill>
+                <a:latin typeface="Century Gothic" panose="020B0502020202020204" pitchFamily="34" charset="0"/>
+              </a:rPr>
+              <a:t>Collar Localizador GPS y Dispensador Automático</a:t>
+            </a:r>
+            <a:endParaRPr lang="en-US" sz="4000" b="1" dirty="0">
+              <a:solidFill>
+                <a:schemeClr val="bg2">
+                  <a:lumMod val="25000"/>
+                </a:schemeClr>
+              </a:solidFill>
               <a:latin typeface="Century Gothic" panose="020B0502020202020204" pitchFamily="34" charset="0"/>
             </a:endParaRPr>
           </a:p>
         </p:txBody>
       </p:sp>
-      <p:grpSp>
-        <p:nvGrpSpPr>
-          <p:cNvPr id="7" name="Group 6">
-            <a:extLst>
-              <a:ext uri="{FF2B5EF4-FFF2-40B4-BE49-F238E27FC236}">
-                <a16:creationId xmlns:a16="http://schemas.microsoft.com/office/drawing/2014/main" id="{DD0D09BF-1856-49B9-9750-D83E002C30EE}"/>
-              </a:ext>
-            </a:extLst>
-          </p:cNvPr>
-          <p:cNvGrpSpPr/>
-          <p:nvPr/>
-        </p:nvGrpSpPr>
-        <p:grpSpPr>
-          <a:xfrm>
-            <a:off x="3063923" y="2128040"/>
-            <a:ext cx="6064154" cy="1938992"/>
-            <a:chOff x="3111690" y="967981"/>
-            <a:chExt cx="6064154" cy="1938992"/>
-          </a:xfrm>
-        </p:grpSpPr>
-        <p:cxnSp>
-          <p:nvCxnSpPr>
-            <p:cNvPr id="6" name="Straight Connector 5">
-              <a:extLst>
-                <a:ext uri="{FF2B5EF4-FFF2-40B4-BE49-F238E27FC236}">
-                  <a16:creationId xmlns:a16="http://schemas.microsoft.com/office/drawing/2014/main" id="{1F3EE42D-C011-485B-A479-643B63DA93A9}"/>
-                </a:ext>
-              </a:extLst>
-            </p:cNvPr>
-            <p:cNvCxnSpPr>
-              <a:cxnSpLocks/>
-            </p:cNvCxnSpPr>
-            <p:nvPr/>
-          </p:nvCxnSpPr>
-          <p:spPr>
-            <a:xfrm>
-              <a:off x="3111690" y="2906973"/>
-              <a:ext cx="6064154" cy="0"/>
-            </a:xfrm>
-            <a:prstGeom prst="line">
-              <a:avLst/>
-            </a:prstGeom>
-            <a:ln w="28575"/>
-          </p:spPr>
-          <p:style>
-            <a:lnRef idx="1">
-              <a:schemeClr val="accent1"/>
-            </a:lnRef>
-            <a:fillRef idx="0">
-              <a:schemeClr val="accent1"/>
-            </a:fillRef>
-            <a:effectRef idx="0">
-              <a:schemeClr val="accent1"/>
-            </a:effectRef>
-            <a:fontRef idx="minor">
-              <a:schemeClr val="tx1"/>
-            </a:fontRef>
-          </p:style>
-        </p:cxnSp>
-        <p:sp>
-          <p:nvSpPr>
-            <p:cNvPr id="8" name="TextBox 7">
-              <a:extLst>
-                <a:ext uri="{FF2B5EF4-FFF2-40B4-BE49-F238E27FC236}">
-                  <a16:creationId xmlns:a16="http://schemas.microsoft.com/office/drawing/2014/main" id="{8B7EA4C1-D5C6-409D-B24D-788007ABEBFD}"/>
-                </a:ext>
-              </a:extLst>
-            </p:cNvPr>
-            <p:cNvSpPr txBox="1"/>
-            <p:nvPr/>
-          </p:nvSpPr>
-          <p:spPr>
-            <a:xfrm>
-              <a:off x="3320955" y="967981"/>
-              <a:ext cx="5854889" cy="1938992"/>
-            </a:xfrm>
-            <a:prstGeom prst="rect">
-              <a:avLst/>
-            </a:prstGeom>
-            <a:noFill/>
-          </p:spPr>
-          <p:txBody>
-            <a:bodyPr wrap="square" rtlCol="0">
-              <a:spAutoFit/>
-            </a:bodyPr>
-            <a:lstStyle/>
-            <a:p>
-              <a:pPr algn="ctr"/>
-              <a:r>
-                <a:rPr lang="es-MX" sz="4000" dirty="0">
-                  <a:latin typeface="Century Gothic" panose="020B0502020202020204" pitchFamily="34" charset="0"/>
-                </a:rPr>
-                <a:t>Localizador y dispensador automático</a:t>
-              </a:r>
-              <a:endParaRPr lang="en-US" sz="4000" dirty="0">
-                <a:latin typeface="Century Gothic" panose="020B0502020202020204" pitchFamily="34" charset="0"/>
-              </a:endParaRPr>
-            </a:p>
-          </p:txBody>
-        </p:sp>
-      </p:grpSp>
     </p:spTree>
     <p:extLst>
       <p:ext uri="{BB962C8B-B14F-4D97-AF65-F5344CB8AC3E}">
@@ -3569,6 +3568,15 @@
 <file path=ppt/slides/slide2.xml><?xml version="1.0" encoding="utf-8"?>
 <p:sld xmlns:a="http://schemas.openxmlformats.org/drawingml/2006/main" xmlns:r="http://schemas.openxmlformats.org/officeDocument/2006/relationships" xmlns:p="http://schemas.openxmlformats.org/presentationml/2006/main">
   <p:cSld>
+    <p:bg>
+      <p:bgPr>
+        <a:blipFill>
+          <a:blip r:embed="rId2"/>
+          <a:tile tx="0" ty="0" sx="100000" sy="100000" flip="none" algn="tl"/>
+        </a:blipFill>
+        <a:effectLst/>
+      </p:bgPr>
+    </p:bg>
     <p:spTree>
       <p:nvGrpSpPr>
         <p:cNvPr id="1" name=""/>
@@ -3597,53 +3605,84 @@
         </p:nvSpPr>
         <p:spPr>
           <a:xfrm>
-            <a:off x="5158854" y="-13648"/>
+            <a:off x="5054351" y="430490"/>
             <a:ext cx="2115403" cy="4804012"/>
+          </a:xfrm>
+          <a:prstGeom prst="rect">
+            <a:avLst/>
+          </a:prstGeom>
+          <a:ln/>
+        </p:spPr>
+        <p:style>
+          <a:lnRef idx="2">
+            <a:schemeClr val="accent2"/>
+          </a:lnRef>
+          <a:fillRef idx="1">
+            <a:schemeClr val="lt1"/>
+          </a:fillRef>
+          <a:effectRef idx="0">
+            <a:schemeClr val="accent2"/>
+          </a:effectRef>
+          <a:fontRef idx="minor">
+            <a:schemeClr val="dk1"/>
+          </a:fontRef>
+        </p:style>
+        <p:txBody>
+          <a:bodyPr rtlCol="0" anchor="ctr"/>
+          <a:lstStyle/>
+          <a:p>
+            <a:pPr algn="ctr"/>
+            <a:endParaRPr lang="es-MX" dirty="0"/>
+          </a:p>
+        </p:txBody>
+      </p:sp>
+      <p:sp>
+        <p:nvSpPr>
+          <p:cNvPr id="5" name="TextBox 4">
+            <a:extLst>
+              <a:ext uri="{FF2B5EF4-FFF2-40B4-BE49-F238E27FC236}">
+                <a16:creationId xmlns:a16="http://schemas.microsoft.com/office/drawing/2014/main" id="{AE4BED70-6F40-4AFF-88A3-7AAC82DAC7C1}"/>
+              </a:ext>
+            </a:extLst>
+          </p:cNvPr>
+          <p:cNvSpPr txBox="1"/>
+          <p:nvPr/>
+        </p:nvSpPr>
+        <p:spPr>
+          <a:xfrm>
+            <a:off x="5054352" y="430490"/>
+            <a:ext cx="2131106" cy="338554"/>
           </a:xfrm>
           <a:prstGeom prst="rect">
             <a:avLst/>
           </a:prstGeom>
           <a:noFill/>
-          <a:ln>
-            <a:solidFill>
-              <a:srgbClr val="0070C0"/>
-            </a:solidFill>
-          </a:ln>
-        </p:spPr>
-        <p:style>
-          <a:lnRef idx="2">
-            <a:schemeClr val="accent1">
-              <a:shade val="50000"/>
-            </a:schemeClr>
-          </a:lnRef>
-          <a:fillRef idx="1">
-            <a:schemeClr val="accent1"/>
-          </a:fillRef>
-          <a:effectRef idx="0">
-            <a:schemeClr val="accent1"/>
-          </a:effectRef>
-          <a:fontRef idx="minor">
-            <a:schemeClr val="lt1"/>
-          </a:fontRef>
-        </p:style>
-        <p:txBody>
-          <a:bodyPr rtlCol="0" anchor="ctr"/>
+        </p:spPr>
+        <p:txBody>
+          <a:bodyPr wrap="square" rtlCol="0">
+            <a:spAutoFit/>
+          </a:bodyPr>
           <a:lstStyle/>
           <a:p>
             <a:pPr algn="ctr"/>
             <a:r>
-              <a:rPr lang="es-MX" dirty="0"/>
-              <a:t>CV</a:t>
-            </a:r>
-          </a:p>
-        </p:txBody>
-      </p:sp>
-      <p:sp>
-        <p:nvSpPr>
-          <p:cNvPr id="5" name="TextBox 4">
-            <a:extLst>
-              <a:ext uri="{FF2B5EF4-FFF2-40B4-BE49-F238E27FC236}">
-                <a16:creationId xmlns:a16="http://schemas.microsoft.com/office/drawing/2014/main" id="{AE4BED70-6F40-4AFF-88A3-7AAC82DAC7C1}"/>
+              <a:rPr lang="es-MX" sz="1600" b="1" dirty="0">
+                <a:solidFill>
+                  <a:schemeClr val="accent2"/>
+                </a:solidFill>
+                <a:latin typeface="Century Gothic" panose="020B0502020202020204" pitchFamily="34" charset="0"/>
+              </a:rPr>
+              <a:t>Propuesta de valor</a:t>
+            </a:r>
+          </a:p>
+        </p:txBody>
+      </p:sp>
+      <p:sp>
+        <p:nvSpPr>
+          <p:cNvPr id="6" name="TextBox 5">
+            <a:extLst>
+              <a:ext uri="{FF2B5EF4-FFF2-40B4-BE49-F238E27FC236}">
+                <a16:creationId xmlns:a16="http://schemas.microsoft.com/office/drawing/2014/main" id="{E8FB3ACF-A153-47BA-82B9-B7F8321D2DB5}"/>
               </a:ext>
             </a:extLst>
           </p:cNvPr>
@@ -3652,8 +3691,8 @@
         </p:nvSpPr>
         <p:spPr>
           <a:xfrm>
-            <a:off x="5202071" y="-13648"/>
-            <a:ext cx="2115403" cy="338554"/>
+            <a:off x="5071978" y="979915"/>
+            <a:ext cx="2097776" cy="3970318"/>
           </a:xfrm>
           <a:prstGeom prst="rect">
             <a:avLst/>
@@ -3666,79 +3705,82 @@
           </a:bodyPr>
           <a:lstStyle/>
           <a:p>
-            <a:r>
-              <a:rPr lang="es-MX" sz="1600" dirty="0">
-                <a:solidFill>
-                  <a:schemeClr val="accent1">
-                    <a:lumMod val="50000"/>
-                  </a:schemeClr>
-                </a:solidFill>
+            <a:pPr algn="ctr"/>
+            <a:r>
+              <a:rPr lang="es-MX" sz="1200" dirty="0">
                 <a:latin typeface="Century Gothic" panose="020B0502020202020204" pitchFamily="34" charset="0"/>
               </a:rPr>
-              <a:t>Propuesta de valor</a:t>
-            </a:r>
-          </a:p>
-        </p:txBody>
-      </p:sp>
-      <p:sp>
-        <p:nvSpPr>
-          <p:cNvPr id="6" name="TextBox 5">
-            <a:extLst>
-              <a:ext uri="{FF2B5EF4-FFF2-40B4-BE49-F238E27FC236}">
-                <a16:creationId xmlns:a16="http://schemas.microsoft.com/office/drawing/2014/main" id="{E8FB3ACF-A153-47BA-82B9-B7F8321D2DB5}"/>
-              </a:ext>
-            </a:extLst>
-          </p:cNvPr>
-          <p:cNvSpPr txBox="1"/>
+              <a:t>Para mejorar la seguridad personal de las mascotas, ofrecemos un collar con localizador GPS para poder encontrarlos en caso de pérdida, combinando seguridad, ergonomía y elegancia al momento de portarlos.</a:t>
+            </a:r>
+          </a:p>
+          <a:p>
+            <a:pPr algn="ctr"/>
+            <a:endParaRPr lang="es-MX" sz="1200" dirty="0">
+              <a:latin typeface="Century Gothic" panose="020B0502020202020204" pitchFamily="34" charset="0"/>
+            </a:endParaRPr>
+          </a:p>
+          <a:p>
+            <a:pPr algn="ctr"/>
+            <a:r>
+              <a:rPr lang="es-MX" sz="1200" dirty="0">
+                <a:latin typeface="Century Gothic" panose="020B0502020202020204" pitchFamily="34" charset="0"/>
+              </a:rPr>
+              <a:t>También nos preocupamos por la alimentación de las mascotas, por lo que ofrecemos un dispensador de comida automático, el cual es programable, logrando así sencillez y comodidad al momento de usarlos.</a:t>
+            </a:r>
+          </a:p>
+        </p:txBody>
+      </p:sp>
+      <p:sp>
+        <p:nvSpPr>
+          <p:cNvPr id="7" name="Rectangle 6">
+            <a:extLst>
+              <a:ext uri="{FF2B5EF4-FFF2-40B4-BE49-F238E27FC236}">
+                <a16:creationId xmlns:a16="http://schemas.microsoft.com/office/drawing/2014/main" id="{26AA47B1-7641-4AE6-BDCD-F1BFCC54F033}"/>
+              </a:ext>
+            </a:extLst>
+          </p:cNvPr>
+          <p:cNvSpPr/>
           <p:nvPr/>
         </p:nvSpPr>
         <p:spPr>
           <a:xfrm>
-            <a:off x="5286375" y="581025"/>
-            <a:ext cx="1885950" cy="3785652"/>
+            <a:off x="7179279" y="427159"/>
+            <a:ext cx="2115403" cy="4804012"/>
           </a:xfrm>
           <a:prstGeom prst="rect">
             <a:avLst/>
           </a:prstGeom>
-          <a:noFill/>
-        </p:spPr>
-        <p:txBody>
-          <a:bodyPr wrap="square" rtlCol="0">
-            <a:spAutoFit/>
-          </a:bodyPr>
-          <a:lstStyle/>
-          <a:p>
-            <a:pPr algn="just"/>
-            <a:r>
-              <a:rPr lang="es-MX" sz="1200" dirty="0">
-                <a:latin typeface="Century Gothic" panose="020B0502020202020204" pitchFamily="34" charset="0"/>
-              </a:rPr>
-              <a:t>Tenemos como objetivo principal brindar una seguridad completa para tu mascota, ofreciendo un collar localizador con estrictas medidas de seguridad.</a:t>
-            </a:r>
-          </a:p>
-          <a:p>
-            <a:pPr algn="just"/>
-            <a:endParaRPr lang="es-MX" sz="1200" dirty="0">
-              <a:latin typeface="Century Gothic" panose="020B0502020202020204" pitchFamily="34" charset="0"/>
-            </a:endParaRPr>
-          </a:p>
-          <a:p>
-            <a:pPr algn="just"/>
-            <a:r>
-              <a:rPr lang="es-MX" sz="1200" dirty="0">
-                <a:latin typeface="Century Gothic" panose="020B0502020202020204" pitchFamily="34" charset="0"/>
-              </a:rPr>
-              <a:t>También nos preocupamos por la salud de tu mascota, por lo que ofrecemos un dispensador automático el cual es programable para adaptarse al horario de alimentación al cual está acostumbrado.</a:t>
-            </a:r>
-          </a:p>
-        </p:txBody>
-      </p:sp>
-      <p:sp>
-        <p:nvSpPr>
-          <p:cNvPr id="7" name="Rectangle 6">
-            <a:extLst>
-              <a:ext uri="{FF2B5EF4-FFF2-40B4-BE49-F238E27FC236}">
-                <a16:creationId xmlns:a16="http://schemas.microsoft.com/office/drawing/2014/main" id="{26AA47B1-7641-4AE6-BDCD-F1BFCC54F033}"/>
+          <a:ln/>
+        </p:spPr>
+        <p:style>
+          <a:lnRef idx="2">
+            <a:schemeClr val="accent2"/>
+          </a:lnRef>
+          <a:fillRef idx="1">
+            <a:schemeClr val="lt1"/>
+          </a:fillRef>
+          <a:effectRef idx="0">
+            <a:schemeClr val="accent2"/>
+          </a:effectRef>
+          <a:fontRef idx="minor">
+            <a:schemeClr val="dk1"/>
+          </a:fontRef>
+        </p:style>
+        <p:txBody>
+          <a:bodyPr rtlCol="0" anchor="ctr"/>
+          <a:lstStyle/>
+          <a:p>
+            <a:pPr algn="ctr"/>
+            <a:endParaRPr lang="es-MX" dirty="0"/>
+          </a:p>
+        </p:txBody>
+      </p:sp>
+      <p:sp>
+        <p:nvSpPr>
+          <p:cNvPr id="8" name="Rectangle 7">
+            <a:extLst>
+              <a:ext uri="{FF2B5EF4-FFF2-40B4-BE49-F238E27FC236}">
+                <a16:creationId xmlns:a16="http://schemas.microsoft.com/office/drawing/2014/main" id="{11A02636-F699-4779-9241-900BA5C9DDC8}"/>
               </a:ext>
             </a:extLst>
           </p:cNvPr>
@@ -3747,33 +3789,26 @@
         </p:nvSpPr>
         <p:spPr>
           <a:xfrm>
-            <a:off x="7283782" y="-16979"/>
-            <a:ext cx="2115403" cy="4804012"/>
+            <a:off x="2931953" y="427159"/>
+            <a:ext cx="2115403" cy="4810640"/>
           </a:xfrm>
           <a:prstGeom prst="rect">
             <a:avLst/>
           </a:prstGeom>
-          <a:noFill/>
-          <a:ln>
-            <a:solidFill>
-              <a:srgbClr val="0070C0"/>
-            </a:solidFill>
-          </a:ln>
+          <a:ln/>
         </p:spPr>
         <p:style>
           <a:lnRef idx="2">
-            <a:schemeClr val="accent1">
-              <a:shade val="50000"/>
-            </a:schemeClr>
+            <a:schemeClr val="accent2"/>
           </a:lnRef>
           <a:fillRef idx="1">
-            <a:schemeClr val="accent1"/>
+            <a:schemeClr val="lt1"/>
           </a:fillRef>
           <a:effectRef idx="0">
-            <a:schemeClr val="accent1"/>
+            <a:schemeClr val="accent2"/>
           </a:effectRef>
           <a:fontRef idx="minor">
-            <a:schemeClr val="lt1"/>
+            <a:schemeClr val="dk1"/>
           </a:fontRef>
         </p:style>
         <p:txBody>
@@ -3781,65 +3816,7 @@
           <a:lstStyle/>
           <a:p>
             <a:pPr algn="ctr"/>
-            <a:r>
-              <a:rPr lang="es-MX" dirty="0"/>
-              <a:t>CV</a:t>
-            </a:r>
-          </a:p>
-        </p:txBody>
-      </p:sp>
-      <p:sp>
-        <p:nvSpPr>
-          <p:cNvPr id="8" name="Rectangle 7">
-            <a:extLst>
-              <a:ext uri="{FF2B5EF4-FFF2-40B4-BE49-F238E27FC236}">
-                <a16:creationId xmlns:a16="http://schemas.microsoft.com/office/drawing/2014/main" id="{11A02636-F699-4779-9241-900BA5C9DDC8}"/>
-              </a:ext>
-            </a:extLst>
-          </p:cNvPr>
-          <p:cNvSpPr/>
-          <p:nvPr/>
-        </p:nvSpPr>
-        <p:spPr>
-          <a:xfrm>
-            <a:off x="3036456" y="-10351"/>
-            <a:ext cx="2115403" cy="4804012"/>
-          </a:xfrm>
-          <a:prstGeom prst="rect">
-            <a:avLst/>
-          </a:prstGeom>
-          <a:noFill/>
-          <a:ln>
-            <a:solidFill>
-              <a:srgbClr val="0070C0"/>
-            </a:solidFill>
-          </a:ln>
-        </p:spPr>
-        <p:style>
-          <a:lnRef idx="2">
-            <a:schemeClr val="accent1">
-              <a:shade val="50000"/>
-            </a:schemeClr>
-          </a:lnRef>
-          <a:fillRef idx="1">
-            <a:schemeClr val="accent1"/>
-          </a:fillRef>
-          <a:effectRef idx="0">
-            <a:schemeClr val="accent1"/>
-          </a:effectRef>
-          <a:fontRef idx="minor">
-            <a:schemeClr val="lt1"/>
-          </a:fontRef>
-        </p:style>
-        <p:txBody>
-          <a:bodyPr rtlCol="0" anchor="ctr"/>
-          <a:lstStyle/>
-          <a:p>
-            <a:pPr algn="ctr"/>
-            <a:r>
-              <a:rPr lang="es-MX" dirty="0"/>
-              <a:t>CV</a:t>
-            </a:r>
+            <a:endParaRPr lang="es-MX" dirty="0"/>
           </a:p>
         </p:txBody>
       </p:sp>
@@ -3861,7 +3838,7 @@
         </p:nvCxnSpPr>
         <p:spPr>
           <a:xfrm>
-            <a:off x="7283782" y="2385027"/>
+            <a:off x="7179279" y="2829165"/>
             <a:ext cx="2115403" cy="0"/>
           </a:xfrm>
           <a:prstGeom prst="line">
@@ -3870,13 +3847,13 @@
         </p:spPr>
         <p:style>
           <a:lnRef idx="1">
-            <a:schemeClr val="accent1"/>
+            <a:schemeClr val="accent2"/>
           </a:lnRef>
           <a:fillRef idx="0">
-            <a:schemeClr val="accent1"/>
+            <a:schemeClr val="accent2"/>
           </a:fillRef>
           <a:effectRef idx="0">
-            <a:schemeClr val="accent1"/>
+            <a:schemeClr val="accent2"/>
           </a:effectRef>
           <a:fontRef idx="minor">
             <a:schemeClr val="tx1"/>
@@ -3893,6 +3870,7 @@
             </a:extLst>
           </p:cNvPr>
           <p:cNvCxnSpPr>
+            <a:cxnSpLocks/>
             <a:stCxn id="8" idx="1"/>
             <a:endCxn id="8" idx="3"/>
           </p:cNvCxnSpPr>
@@ -3900,7 +3878,7 @@
         </p:nvCxnSpPr>
         <p:spPr>
           <a:xfrm>
-            <a:off x="3036456" y="2391655"/>
+            <a:off x="2931953" y="2832479"/>
             <a:ext cx="2115403" cy="0"/>
           </a:xfrm>
           <a:prstGeom prst="line">
@@ -3909,13 +3887,13 @@
         </p:spPr>
         <p:style>
           <a:lnRef idx="1">
-            <a:schemeClr val="accent1"/>
+            <a:schemeClr val="accent2"/>
           </a:lnRef>
           <a:fillRef idx="0">
-            <a:schemeClr val="accent1"/>
+            <a:schemeClr val="accent2"/>
           </a:fillRef>
           <a:effectRef idx="0">
-            <a:schemeClr val="accent1"/>
+            <a:schemeClr val="accent2"/>
           </a:effectRef>
           <a:fontRef idx="minor">
             <a:schemeClr val="tx1"/>
@@ -3936,212 +3914,615 @@
         </p:nvSpPr>
         <p:spPr>
           <a:xfrm>
-            <a:off x="9407894" y="-16979"/>
+            <a:off x="9303391" y="427159"/>
             <a:ext cx="2115403" cy="4804012"/>
+          </a:xfrm>
+          <a:prstGeom prst="rect">
+            <a:avLst/>
+          </a:prstGeom>
+          <a:ln/>
+        </p:spPr>
+        <p:style>
+          <a:lnRef idx="2">
+            <a:schemeClr val="accent2"/>
+          </a:lnRef>
+          <a:fillRef idx="1">
+            <a:schemeClr val="lt1"/>
+          </a:fillRef>
+          <a:effectRef idx="0">
+            <a:schemeClr val="accent2"/>
+          </a:effectRef>
+          <a:fontRef idx="minor">
+            <a:schemeClr val="dk1"/>
+          </a:fontRef>
+        </p:style>
+        <p:txBody>
+          <a:bodyPr rtlCol="0" anchor="ctr"/>
+          <a:lstStyle/>
+          <a:p>
+            <a:pPr algn="ctr"/>
+            <a:endParaRPr lang="es-MX" dirty="0"/>
+          </a:p>
+        </p:txBody>
+      </p:sp>
+      <p:sp>
+        <p:nvSpPr>
+          <p:cNvPr id="13" name="Rectangle 12">
+            <a:extLst>
+              <a:ext uri="{FF2B5EF4-FFF2-40B4-BE49-F238E27FC236}">
+                <a16:creationId xmlns:a16="http://schemas.microsoft.com/office/drawing/2014/main" id="{D746DF80-D441-4D23-BC1A-0BA4961FD614}"/>
+              </a:ext>
+            </a:extLst>
+          </p:cNvPr>
+          <p:cNvSpPr/>
+          <p:nvPr/>
+        </p:nvSpPr>
+        <p:spPr>
+          <a:xfrm>
+            <a:off x="807841" y="427159"/>
+            <a:ext cx="2115403" cy="4810640"/>
+          </a:xfrm>
+          <a:prstGeom prst="rect">
+            <a:avLst/>
+          </a:prstGeom>
+          <a:ln/>
+        </p:spPr>
+        <p:style>
+          <a:lnRef idx="2">
+            <a:schemeClr val="accent2"/>
+          </a:lnRef>
+          <a:fillRef idx="1">
+            <a:schemeClr val="lt1"/>
+          </a:fillRef>
+          <a:effectRef idx="0">
+            <a:schemeClr val="accent2"/>
+          </a:effectRef>
+          <a:fontRef idx="minor">
+            <a:schemeClr val="dk1"/>
+          </a:fontRef>
+        </p:style>
+        <p:txBody>
+          <a:bodyPr rtlCol="0" anchor="ctr"/>
+          <a:lstStyle/>
+          <a:p>
+            <a:pPr algn="ctr"/>
+            <a:endParaRPr lang="es-MX" dirty="0"/>
+          </a:p>
+        </p:txBody>
+      </p:sp>
+      <p:sp>
+        <p:nvSpPr>
+          <p:cNvPr id="14" name="Rectangle 13">
+            <a:extLst>
+              <a:ext uri="{FF2B5EF4-FFF2-40B4-BE49-F238E27FC236}">
+                <a16:creationId xmlns:a16="http://schemas.microsoft.com/office/drawing/2014/main" id="{456EF293-048E-4F45-A5B2-EE5FF9BF1196}"/>
+              </a:ext>
+            </a:extLst>
+          </p:cNvPr>
+          <p:cNvSpPr/>
+          <p:nvPr/>
+        </p:nvSpPr>
+        <p:spPr>
+          <a:xfrm>
+            <a:off x="807841" y="5237799"/>
+            <a:ext cx="5183656" cy="1306888"/>
+          </a:xfrm>
+          <a:prstGeom prst="rect">
+            <a:avLst/>
+          </a:prstGeom>
+          <a:ln w="12700"/>
+        </p:spPr>
+        <p:style>
+          <a:lnRef idx="2">
+            <a:schemeClr val="accent2"/>
+          </a:lnRef>
+          <a:fillRef idx="1">
+            <a:schemeClr val="lt1"/>
+          </a:fillRef>
+          <a:effectRef idx="0">
+            <a:schemeClr val="accent2"/>
+          </a:effectRef>
+          <a:fontRef idx="minor">
+            <a:schemeClr val="dk1"/>
+          </a:fontRef>
+        </p:style>
+        <p:txBody>
+          <a:bodyPr rtlCol="0" anchor="ctr"/>
+          <a:lstStyle/>
+          <a:p>
+            <a:pPr algn="ctr"/>
+            <a:endParaRPr lang="es-MX"/>
+          </a:p>
+        </p:txBody>
+      </p:sp>
+      <p:sp>
+        <p:nvSpPr>
+          <p:cNvPr id="15" name="Rectangle 14">
+            <a:extLst>
+              <a:ext uri="{FF2B5EF4-FFF2-40B4-BE49-F238E27FC236}">
+                <a16:creationId xmlns:a16="http://schemas.microsoft.com/office/drawing/2014/main" id="{79386728-58AB-4345-8EC7-A81BA7A49F7C}"/>
+              </a:ext>
+            </a:extLst>
+          </p:cNvPr>
+          <p:cNvSpPr/>
+          <p:nvPr/>
+        </p:nvSpPr>
+        <p:spPr>
+          <a:xfrm>
+            <a:off x="5998492" y="5237799"/>
+            <a:ext cx="5420302" cy="1306888"/>
+          </a:xfrm>
+          <a:prstGeom prst="rect">
+            <a:avLst/>
+          </a:prstGeom>
+          <a:ln/>
+        </p:spPr>
+        <p:style>
+          <a:lnRef idx="2">
+            <a:schemeClr val="accent2"/>
+          </a:lnRef>
+          <a:fillRef idx="1">
+            <a:schemeClr val="lt1"/>
+          </a:fillRef>
+          <a:effectRef idx="0">
+            <a:schemeClr val="accent2"/>
+          </a:effectRef>
+          <a:fontRef idx="minor">
+            <a:schemeClr val="dk1"/>
+          </a:fontRef>
+        </p:style>
+        <p:txBody>
+          <a:bodyPr rtlCol="0" anchor="ctr"/>
+          <a:lstStyle/>
+          <a:p>
+            <a:pPr algn="ctr"/>
+            <a:endParaRPr lang="es-MX"/>
+          </a:p>
+        </p:txBody>
+      </p:sp>
+      <p:sp>
+        <p:nvSpPr>
+          <p:cNvPr id="16" name="TextBox 15">
+            <a:extLst>
+              <a:ext uri="{FF2B5EF4-FFF2-40B4-BE49-F238E27FC236}">
+                <a16:creationId xmlns:a16="http://schemas.microsoft.com/office/drawing/2014/main" id="{27867483-9E4F-4C88-82E7-1485D810E59F}"/>
+              </a:ext>
+            </a:extLst>
+          </p:cNvPr>
+          <p:cNvSpPr txBox="1"/>
+          <p:nvPr/>
+        </p:nvSpPr>
+        <p:spPr>
+          <a:xfrm>
+            <a:off x="9310386" y="430490"/>
+            <a:ext cx="2115403" cy="584775"/>
+          </a:xfrm>
+          <a:prstGeom prst="rect">
+            <a:avLst/>
+          </a:prstGeom>
+          <a:noFill/>
+        </p:spPr>
+        <p:txBody>
+          <a:bodyPr wrap="square" rtlCol="0">
+            <a:spAutoFit/>
+          </a:bodyPr>
+          <a:lstStyle/>
+          <a:p>
+            <a:pPr algn="ctr"/>
+            <a:r>
+              <a:rPr lang="es-MX" sz="1600" b="1" dirty="0">
+                <a:solidFill>
+                  <a:schemeClr val="accent2"/>
+                </a:solidFill>
+                <a:latin typeface="Century Gothic" panose="020B0502020202020204" pitchFamily="34" charset="0"/>
+              </a:rPr>
+              <a:t>Segmentos de cliente</a:t>
+            </a:r>
+          </a:p>
+        </p:txBody>
+      </p:sp>
+      <p:sp>
+        <p:nvSpPr>
+          <p:cNvPr id="17" name="TextBox 16">
+            <a:extLst>
+              <a:ext uri="{FF2B5EF4-FFF2-40B4-BE49-F238E27FC236}">
+                <a16:creationId xmlns:a16="http://schemas.microsoft.com/office/drawing/2014/main" id="{691BF336-6BD1-4C6C-BC9E-D95FBBB0E910}"/>
+              </a:ext>
+            </a:extLst>
+          </p:cNvPr>
+          <p:cNvSpPr txBox="1"/>
+          <p:nvPr/>
+        </p:nvSpPr>
+        <p:spPr>
+          <a:xfrm>
+            <a:off x="9303391" y="1511973"/>
+            <a:ext cx="2115403" cy="3416320"/>
+          </a:xfrm>
+          <a:prstGeom prst="rect">
+            <a:avLst/>
+          </a:prstGeom>
+          <a:noFill/>
+        </p:spPr>
+        <p:txBody>
+          <a:bodyPr wrap="square" rtlCol="0">
+            <a:spAutoFit/>
+          </a:bodyPr>
+          <a:lstStyle/>
+          <a:p>
+            <a:pPr algn="ctr"/>
+            <a:r>
+              <a:rPr lang="es-MX" sz="1200" dirty="0">
+                <a:latin typeface="Century Gothic" panose="020B0502020202020204" pitchFamily="34" charset="0"/>
+              </a:rPr>
+              <a:t>El collar está pensado para cualquier persona que posea un perro o un gato como mascota, el cual también se adapta en tamaño dependiendo de la raza del animal.</a:t>
+            </a:r>
+          </a:p>
+          <a:p>
+            <a:pPr algn="ctr"/>
+            <a:endParaRPr lang="es-MX" sz="1200" dirty="0">
+              <a:latin typeface="Century Gothic" panose="020B0502020202020204" pitchFamily="34" charset="0"/>
+            </a:endParaRPr>
+          </a:p>
+          <a:p>
+            <a:pPr algn="ctr"/>
+            <a:r>
+              <a:rPr lang="es-MX" sz="1200" dirty="0">
+                <a:latin typeface="Century Gothic" panose="020B0502020202020204" pitchFamily="34" charset="0"/>
+              </a:rPr>
+              <a:t>El dispensador está pensado para aquellas personas que posean un perro, un gato o pez como mascota, las cuales debido a diferentes impedimentos, no puedan alimentar correctamente a tiempo a sus mascotas.</a:t>
+            </a:r>
+          </a:p>
+        </p:txBody>
+      </p:sp>
+      <p:sp>
+        <p:nvSpPr>
+          <p:cNvPr id="18" name="TextBox 17">
+            <a:extLst>
+              <a:ext uri="{FF2B5EF4-FFF2-40B4-BE49-F238E27FC236}">
+                <a16:creationId xmlns:a16="http://schemas.microsoft.com/office/drawing/2014/main" id="{CBEA1268-4F03-484C-BF36-ED5D87CB29EE}"/>
+              </a:ext>
+            </a:extLst>
+          </p:cNvPr>
+          <p:cNvSpPr txBox="1"/>
+          <p:nvPr/>
+        </p:nvSpPr>
+        <p:spPr>
+          <a:xfrm>
+            <a:off x="7180572" y="2831990"/>
+            <a:ext cx="2115403" cy="523220"/>
+          </a:xfrm>
+          <a:prstGeom prst="rect">
+            <a:avLst/>
+          </a:prstGeom>
+          <a:noFill/>
+        </p:spPr>
+        <p:txBody>
+          <a:bodyPr wrap="square" rtlCol="0">
+            <a:spAutoFit/>
+          </a:bodyPr>
+          <a:lstStyle/>
+          <a:p>
+            <a:pPr algn="ctr"/>
+            <a:r>
+              <a:rPr lang="es-MX" sz="1400" b="1" dirty="0">
+                <a:solidFill>
+                  <a:schemeClr val="accent2"/>
+                </a:solidFill>
+                <a:latin typeface="Century Gothic" panose="020B0502020202020204" pitchFamily="34" charset="0"/>
+              </a:rPr>
+              <a:t>Canales de comunicación</a:t>
+            </a:r>
+            <a:endParaRPr lang="es-MX" sz="1600" b="1" dirty="0">
+              <a:solidFill>
+                <a:schemeClr val="accent2"/>
+              </a:solidFill>
+              <a:latin typeface="Century Gothic" panose="020B0502020202020204" pitchFamily="34" charset="0"/>
+            </a:endParaRPr>
+          </a:p>
+        </p:txBody>
+      </p:sp>
+      <p:sp>
+        <p:nvSpPr>
+          <p:cNvPr id="19" name="TextBox 18">
+            <a:extLst>
+              <a:ext uri="{FF2B5EF4-FFF2-40B4-BE49-F238E27FC236}">
+                <a16:creationId xmlns:a16="http://schemas.microsoft.com/office/drawing/2014/main" id="{7029AA6B-2CA1-4FEE-8775-D4ED7F2A9FD1}"/>
+              </a:ext>
+            </a:extLst>
+          </p:cNvPr>
+          <p:cNvSpPr txBox="1"/>
+          <p:nvPr/>
+        </p:nvSpPr>
+        <p:spPr>
+          <a:xfrm>
+            <a:off x="7185458" y="3278449"/>
+            <a:ext cx="2098883" cy="1954381"/>
+          </a:xfrm>
+          <a:prstGeom prst="rect">
+            <a:avLst/>
+          </a:prstGeom>
+          <a:noFill/>
+        </p:spPr>
+        <p:txBody>
+          <a:bodyPr wrap="square" rtlCol="0">
+            <a:spAutoFit/>
+          </a:bodyPr>
+          <a:lstStyle/>
+          <a:p>
+            <a:pPr algn="ctr"/>
+            <a:r>
+              <a:rPr lang="es-MX" sz="1100" dirty="0">
+                <a:latin typeface="Century Gothic" panose="020B0502020202020204" pitchFamily="34" charset="0"/>
+              </a:rPr>
+              <a:t>Nuestros clientes podrán comprar nuestros productos mediante la página web oficial de la empresa, y la entrega de estos será mediante paquetería.</a:t>
+            </a:r>
+          </a:p>
+          <a:p>
+            <a:pPr algn="ctr"/>
+            <a:r>
+              <a:rPr lang="es-MX" sz="1100" dirty="0">
+                <a:latin typeface="Century Gothic" panose="020B0502020202020204" pitchFamily="34" charset="0"/>
+              </a:rPr>
+              <a:t>Además, daremos a conocer nuestros productos a veterinarias locales y mediante redes sociales como Facebook y Twitter.</a:t>
+            </a:r>
+          </a:p>
+        </p:txBody>
+      </p:sp>
+      <p:sp>
+        <p:nvSpPr>
+          <p:cNvPr id="20" name="TextBox 19">
+            <a:extLst>
+              <a:ext uri="{FF2B5EF4-FFF2-40B4-BE49-F238E27FC236}">
+                <a16:creationId xmlns:a16="http://schemas.microsoft.com/office/drawing/2014/main" id="{338DDC51-2182-42F5-B73D-F908F81FF5B5}"/>
+              </a:ext>
+            </a:extLst>
+          </p:cNvPr>
+          <p:cNvSpPr txBox="1"/>
+          <p:nvPr/>
+        </p:nvSpPr>
+        <p:spPr>
+          <a:xfrm>
+            <a:off x="7184835" y="443428"/>
+            <a:ext cx="2088705" cy="584775"/>
+          </a:xfrm>
+          <a:prstGeom prst="rect">
+            <a:avLst/>
+          </a:prstGeom>
+          <a:noFill/>
+        </p:spPr>
+        <p:txBody>
+          <a:bodyPr wrap="square" rtlCol="0">
+            <a:spAutoFit/>
+          </a:bodyPr>
+          <a:lstStyle/>
+          <a:p>
+            <a:pPr algn="ctr"/>
+            <a:r>
+              <a:rPr lang="es-MX" sz="1600" b="1" dirty="0">
+                <a:solidFill>
+                  <a:schemeClr val="accent2"/>
+                </a:solidFill>
+                <a:latin typeface="Century Gothic" panose="020B0502020202020204" pitchFamily="34" charset="0"/>
+              </a:rPr>
+              <a:t>Relación con el cliente</a:t>
+            </a:r>
+          </a:p>
+        </p:txBody>
+      </p:sp>
+      <p:sp>
+        <p:nvSpPr>
+          <p:cNvPr id="21" name="TextBox 20">
+            <a:extLst>
+              <a:ext uri="{FF2B5EF4-FFF2-40B4-BE49-F238E27FC236}">
+                <a16:creationId xmlns:a16="http://schemas.microsoft.com/office/drawing/2014/main" id="{B425887D-1C27-4332-8EE2-9A06F37296BE}"/>
+              </a:ext>
+            </a:extLst>
+          </p:cNvPr>
+          <p:cNvSpPr txBox="1"/>
+          <p:nvPr/>
+        </p:nvSpPr>
+        <p:spPr>
+          <a:xfrm>
+            <a:off x="7186274" y="1157619"/>
+            <a:ext cx="2115402" cy="1569660"/>
+          </a:xfrm>
+          <a:prstGeom prst="rect">
+            <a:avLst/>
+          </a:prstGeom>
+          <a:noFill/>
+        </p:spPr>
+        <p:txBody>
+          <a:bodyPr wrap="square" rtlCol="0">
+            <a:spAutoFit/>
+          </a:bodyPr>
+          <a:lstStyle/>
+          <a:p>
+            <a:pPr algn="ctr"/>
+            <a:r>
+              <a:rPr lang="es-MX" sz="1200" dirty="0">
+                <a:latin typeface="Century Gothic" panose="020B0502020202020204" pitchFamily="34" charset="0"/>
+              </a:rPr>
+              <a:t>Las estrategias de Marketing estarán implementadas en nuestra página oficial, y le ofrecemos a nuestros clientes la posibilidad de comunicarse con nosotros.</a:t>
+            </a:r>
+          </a:p>
+        </p:txBody>
+      </p:sp>
+      <p:sp>
+        <p:nvSpPr>
+          <p:cNvPr id="22" name="TextBox 21">
+            <a:extLst>
+              <a:ext uri="{FF2B5EF4-FFF2-40B4-BE49-F238E27FC236}">
+                <a16:creationId xmlns:a16="http://schemas.microsoft.com/office/drawing/2014/main" id="{DA76E01B-B50F-40E0-BDC3-E9B750A87EBB}"/>
+              </a:ext>
+            </a:extLst>
+          </p:cNvPr>
+          <p:cNvSpPr txBox="1"/>
+          <p:nvPr/>
+        </p:nvSpPr>
+        <p:spPr>
+          <a:xfrm>
+            <a:off x="6005487" y="5235172"/>
+            <a:ext cx="5427306" cy="338554"/>
           </a:xfrm>
           <a:prstGeom prst="rect">
             <a:avLst/>
           </a:prstGeom>
           <a:noFill/>
           <a:ln>
-            <a:solidFill>
-              <a:srgbClr val="0070C0"/>
-            </a:solidFill>
+            <a:noFill/>
           </a:ln>
         </p:spPr>
-        <p:style>
-          <a:lnRef idx="2">
-            <a:schemeClr val="accent1">
-              <a:shade val="50000"/>
-            </a:schemeClr>
-          </a:lnRef>
-          <a:fillRef idx="1">
-            <a:schemeClr val="accent1"/>
-          </a:fillRef>
-          <a:effectRef idx="0">
-            <a:schemeClr val="accent1"/>
-          </a:effectRef>
-          <a:fontRef idx="minor">
-            <a:schemeClr val="lt1"/>
-          </a:fontRef>
-        </p:style>
-        <p:txBody>
-          <a:bodyPr rtlCol="0" anchor="ctr"/>
+        <p:txBody>
+          <a:bodyPr wrap="square" rtlCol="0">
+            <a:spAutoFit/>
+          </a:bodyPr>
           <a:lstStyle/>
           <a:p>
             <a:pPr algn="ctr"/>
             <a:r>
-              <a:rPr lang="es-MX" dirty="0"/>
-              <a:t>CV</a:t>
-            </a:r>
-          </a:p>
-        </p:txBody>
-      </p:sp>
-      <p:sp>
-        <p:nvSpPr>
-          <p:cNvPr id="13" name="Rectangle 12">
-            <a:extLst>
-              <a:ext uri="{FF2B5EF4-FFF2-40B4-BE49-F238E27FC236}">
-                <a16:creationId xmlns:a16="http://schemas.microsoft.com/office/drawing/2014/main" id="{D746DF80-D441-4D23-BC1A-0BA4961FD614}"/>
-              </a:ext>
-            </a:extLst>
-          </p:cNvPr>
-          <p:cNvSpPr/>
+              <a:rPr lang="es-MX" sz="1600" b="1" dirty="0">
+                <a:solidFill>
+                  <a:schemeClr val="accent2"/>
+                </a:solidFill>
+                <a:latin typeface="Century Gothic" panose="020B0502020202020204" pitchFamily="34" charset="0"/>
+              </a:rPr>
+              <a:t>Flujo de Ingresos</a:t>
+            </a:r>
+          </a:p>
+        </p:txBody>
+      </p:sp>
+      <p:sp>
+        <p:nvSpPr>
+          <p:cNvPr id="23" name="TextBox 22">
+            <a:extLst>
+              <a:ext uri="{FF2B5EF4-FFF2-40B4-BE49-F238E27FC236}">
+                <a16:creationId xmlns:a16="http://schemas.microsoft.com/office/drawing/2014/main" id="{C9C5B57C-CE28-4BF7-8095-ED24D16A3EB2}"/>
+              </a:ext>
+            </a:extLst>
+          </p:cNvPr>
+          <p:cNvSpPr txBox="1"/>
           <p:nvPr/>
         </p:nvSpPr>
         <p:spPr>
           <a:xfrm>
-            <a:off x="912344" y="-10351"/>
-            <a:ext cx="2115403" cy="4804012"/>
+            <a:off x="5989773" y="5685181"/>
+            <a:ext cx="5420301" cy="830997"/>
           </a:xfrm>
           <a:prstGeom prst="rect">
             <a:avLst/>
           </a:prstGeom>
           <a:noFill/>
-          <a:ln>
-            <a:solidFill>
-              <a:srgbClr val="0070C0"/>
-            </a:solidFill>
-          </a:ln>
-        </p:spPr>
-        <p:style>
-          <a:lnRef idx="2">
-            <a:schemeClr val="accent1">
-              <a:shade val="50000"/>
-            </a:schemeClr>
-          </a:lnRef>
-          <a:fillRef idx="1">
-            <a:schemeClr val="accent1"/>
-          </a:fillRef>
-          <a:effectRef idx="0">
-            <a:schemeClr val="accent1"/>
-          </a:effectRef>
-          <a:fontRef idx="minor">
-            <a:schemeClr val="lt1"/>
-          </a:fontRef>
-        </p:style>
-        <p:txBody>
-          <a:bodyPr rtlCol="0" anchor="ctr"/>
+        </p:spPr>
+        <p:txBody>
+          <a:bodyPr wrap="square" rtlCol="0">
+            <a:spAutoFit/>
+          </a:bodyPr>
           <a:lstStyle/>
           <a:p>
             <a:pPr algn="ctr"/>
             <a:r>
-              <a:rPr lang="es-MX" dirty="0"/>
-              <a:t>CV</a:t>
-            </a:r>
-          </a:p>
-        </p:txBody>
-      </p:sp>
-      <p:sp>
-        <p:nvSpPr>
-          <p:cNvPr id="14" name="Rectangle 13">
-            <a:extLst>
-              <a:ext uri="{FF2B5EF4-FFF2-40B4-BE49-F238E27FC236}">
-                <a16:creationId xmlns:a16="http://schemas.microsoft.com/office/drawing/2014/main" id="{456EF293-048E-4F45-A5B2-EE5FF9BF1196}"/>
-              </a:ext>
-            </a:extLst>
-          </p:cNvPr>
-          <p:cNvSpPr/>
+              <a:rPr lang="es-MX" sz="1200" dirty="0">
+                <a:latin typeface="Century Gothic" panose="020B0502020202020204" pitchFamily="34" charset="0"/>
+              </a:rPr>
+              <a:t>La retribución por nuestros productos se obtendrán mediante el pago de los usuarios a través de la tienda virtual en nuestra página oficial.</a:t>
+            </a:r>
+          </a:p>
+          <a:p>
+            <a:pPr algn="ctr"/>
+            <a:r>
+              <a:rPr lang="es-MX" sz="1200" dirty="0">
+                <a:latin typeface="Century Gothic" panose="020B0502020202020204" pitchFamily="34" charset="0"/>
+              </a:rPr>
+              <a:t>La forma de pago será mediante tarjeta de débito/crédito utilizando el servicio de PayPal. Una forma segura y fácil de pagar.</a:t>
+            </a:r>
+          </a:p>
+        </p:txBody>
+      </p:sp>
+      <p:sp>
+        <p:nvSpPr>
+          <p:cNvPr id="24" name="TextBox 23">
+            <a:extLst>
+              <a:ext uri="{FF2B5EF4-FFF2-40B4-BE49-F238E27FC236}">
+                <a16:creationId xmlns:a16="http://schemas.microsoft.com/office/drawing/2014/main" id="{D813653D-C91A-48A2-8F27-2A3AA927E68B}"/>
+              </a:ext>
+            </a:extLst>
+          </p:cNvPr>
+          <p:cNvSpPr txBox="1"/>
           <p:nvPr/>
         </p:nvSpPr>
         <p:spPr>
           <a:xfrm>
-            <a:off x="912344" y="4793661"/>
-            <a:ext cx="5183656" cy="1306888"/>
+            <a:off x="2943230" y="2871925"/>
+            <a:ext cx="2115403" cy="338554"/>
           </a:xfrm>
           <a:prstGeom prst="rect">
             <a:avLst/>
           </a:prstGeom>
           <a:noFill/>
-          <a:ln>
-            <a:solidFill>
-              <a:schemeClr val="accent1"/>
-            </a:solidFill>
-          </a:ln>
-        </p:spPr>
-        <p:style>
-          <a:lnRef idx="2">
-            <a:schemeClr val="accent1">
-              <a:shade val="50000"/>
-            </a:schemeClr>
-          </a:lnRef>
-          <a:fillRef idx="1">
-            <a:schemeClr val="accent1"/>
-          </a:fillRef>
-          <a:effectRef idx="0">
-            <a:schemeClr val="accent1"/>
-          </a:effectRef>
-          <a:fontRef idx="minor">
-            <a:schemeClr val="lt1"/>
-          </a:fontRef>
-        </p:style>
-        <p:txBody>
-          <a:bodyPr rtlCol="0" anchor="ctr"/>
+        </p:spPr>
+        <p:txBody>
+          <a:bodyPr wrap="square" rtlCol="0">
+            <a:spAutoFit/>
+          </a:bodyPr>
           <a:lstStyle/>
           <a:p>
             <a:pPr algn="ctr"/>
-            <a:endParaRPr lang="es-MX"/>
-          </a:p>
-        </p:txBody>
-      </p:sp>
-      <p:sp>
-        <p:nvSpPr>
-          <p:cNvPr id="15" name="Rectangle 14">
-            <a:extLst>
-              <a:ext uri="{FF2B5EF4-FFF2-40B4-BE49-F238E27FC236}">
-                <a16:creationId xmlns:a16="http://schemas.microsoft.com/office/drawing/2014/main" id="{79386728-58AB-4345-8EC7-A81BA7A49F7C}"/>
-              </a:ext>
-            </a:extLst>
-          </p:cNvPr>
-          <p:cNvSpPr/>
+            <a:r>
+              <a:rPr lang="es-MX" sz="1600" b="1" dirty="0">
+                <a:solidFill>
+                  <a:schemeClr val="accent2"/>
+                </a:solidFill>
+                <a:latin typeface="Century Gothic" panose="020B0502020202020204" pitchFamily="34" charset="0"/>
+              </a:rPr>
+              <a:t>Recursos clave</a:t>
+            </a:r>
+          </a:p>
+        </p:txBody>
+      </p:sp>
+      <p:sp>
+        <p:nvSpPr>
+          <p:cNvPr id="25" name="TextBox 24">
+            <a:extLst>
+              <a:ext uri="{FF2B5EF4-FFF2-40B4-BE49-F238E27FC236}">
+                <a16:creationId xmlns:a16="http://schemas.microsoft.com/office/drawing/2014/main" id="{83AB05C1-4ACB-4401-BDA1-8B4DEC9E40EC}"/>
+              </a:ext>
+            </a:extLst>
+          </p:cNvPr>
+          <p:cNvSpPr txBox="1"/>
           <p:nvPr/>
         </p:nvSpPr>
         <p:spPr>
           <a:xfrm>
-            <a:off x="6102995" y="4793661"/>
-            <a:ext cx="5420302" cy="1306888"/>
+            <a:off x="2940871" y="3246788"/>
+            <a:ext cx="2123505" cy="1938992"/>
           </a:xfrm>
           <a:prstGeom prst="rect">
             <a:avLst/>
           </a:prstGeom>
           <a:noFill/>
-          <a:ln>
-            <a:solidFill>
-              <a:schemeClr val="accent1"/>
-            </a:solidFill>
-          </a:ln>
-        </p:spPr>
-        <p:style>
-          <a:lnRef idx="2">
-            <a:schemeClr val="accent1">
-              <a:shade val="50000"/>
-            </a:schemeClr>
-          </a:lnRef>
-          <a:fillRef idx="1">
-            <a:schemeClr val="accent1"/>
-          </a:fillRef>
-          <a:effectRef idx="0">
-            <a:schemeClr val="accent1"/>
-          </a:effectRef>
-          <a:fontRef idx="minor">
-            <a:schemeClr val="lt1"/>
-          </a:fontRef>
-        </p:style>
-        <p:txBody>
-          <a:bodyPr rtlCol="0" anchor="ctr"/>
+        </p:spPr>
+        <p:txBody>
+          <a:bodyPr wrap="square" rtlCol="0">
+            <a:spAutoFit/>
+          </a:bodyPr>
           <a:lstStyle/>
           <a:p>
             <a:pPr algn="ctr"/>
-            <a:endParaRPr lang="es-MX"/>
-          </a:p>
-        </p:txBody>
-      </p:sp>
-      <p:sp>
-        <p:nvSpPr>
-          <p:cNvPr id="16" name="TextBox 15">
-            <a:extLst>
-              <a:ext uri="{FF2B5EF4-FFF2-40B4-BE49-F238E27FC236}">
-                <a16:creationId xmlns:a16="http://schemas.microsoft.com/office/drawing/2014/main" id="{27867483-9E4F-4C88-82E7-1485D810E59F}"/>
+            <a:r>
+              <a:rPr lang="es-MX" sz="1200" dirty="0">
+                <a:latin typeface="Century Gothic" panose="020B0502020202020204" pitchFamily="34" charset="0"/>
+              </a:rPr>
+              <a:t>Para lograr fabricar los productos se necesitará mano de obra especializada, tales como Ingenieros y Licenciados, un lugar adecuado para el desarrollo de este y el material necesario para su producción.</a:t>
+            </a:r>
+          </a:p>
+        </p:txBody>
+      </p:sp>
+      <p:sp>
+        <p:nvSpPr>
+          <p:cNvPr id="26" name="TextBox 25">
+            <a:extLst>
+              <a:ext uri="{FF2B5EF4-FFF2-40B4-BE49-F238E27FC236}">
+                <a16:creationId xmlns:a16="http://schemas.microsoft.com/office/drawing/2014/main" id="{4CF5A6C1-F0BA-4249-AB57-98E7A23749B4}"/>
               </a:ext>
             </a:extLst>
           </p:cNvPr>
@@ -4150,8 +4531,8 @@
         </p:nvSpPr>
         <p:spPr>
           <a:xfrm>
-            <a:off x="9414889" y="-13648"/>
-            <a:ext cx="2115403" cy="584775"/>
+            <a:off x="811452" y="439589"/>
+            <a:ext cx="2115403" cy="338554"/>
           </a:xfrm>
           <a:prstGeom prst="rect">
             <a:avLst/>
@@ -4166,25 +4547,23 @@
           <a:p>
             <a:pPr algn="ctr"/>
             <a:r>
-              <a:rPr lang="es-MX" sz="1600" dirty="0">
+              <a:rPr lang="es-MX" sz="1600" b="1" dirty="0">
                 <a:solidFill>
-                  <a:schemeClr val="accent1">
-                    <a:lumMod val="50000"/>
-                  </a:schemeClr>
+                  <a:schemeClr val="accent2"/>
                 </a:solidFill>
                 <a:latin typeface="Century Gothic" panose="020B0502020202020204" pitchFamily="34" charset="0"/>
               </a:rPr>
-              <a:t>Segmentos de cliente</a:t>
-            </a:r>
-          </a:p>
-        </p:txBody>
-      </p:sp>
-      <p:sp>
-        <p:nvSpPr>
-          <p:cNvPr id="17" name="TextBox 16">
-            <a:extLst>
-              <a:ext uri="{FF2B5EF4-FFF2-40B4-BE49-F238E27FC236}">
-                <a16:creationId xmlns:a16="http://schemas.microsoft.com/office/drawing/2014/main" id="{691BF336-6BD1-4C6C-BC9E-D95FBBB0E910}"/>
+              <a:t>Socios clave</a:t>
+            </a:r>
+          </a:p>
+        </p:txBody>
+      </p:sp>
+      <p:sp>
+        <p:nvSpPr>
+          <p:cNvPr id="27" name="TextBox 26">
+            <a:extLst>
+              <a:ext uri="{FF2B5EF4-FFF2-40B4-BE49-F238E27FC236}">
+                <a16:creationId xmlns:a16="http://schemas.microsoft.com/office/drawing/2014/main" id="{3798F32A-0000-4CB1-B1C5-685C36B2BBD3}"/>
               </a:ext>
             </a:extLst>
           </p:cNvPr>
@@ -4193,8 +4572,8 @@
         </p:nvSpPr>
         <p:spPr>
           <a:xfrm>
-            <a:off x="9522620" y="666458"/>
-            <a:ext cx="1885950" cy="3785652"/>
+            <a:off x="814021" y="1034262"/>
+            <a:ext cx="2115402" cy="3416320"/>
           </a:xfrm>
           <a:prstGeom prst="rect">
             <a:avLst/>
@@ -4207,43 +4586,31 @@
           </a:bodyPr>
           <a:lstStyle/>
           <a:p>
-            <a:pPr algn="just"/>
+            <a:pPr algn="ctr"/>
             <a:r>
               <a:rPr lang="es-MX" sz="1200" dirty="0">
                 <a:latin typeface="Century Gothic" panose="020B0502020202020204" pitchFamily="34" charset="0"/>
               </a:rPr>
-              <a:t>Nuestros productos están pensados para personas que viajan con mucha frecuencia y no pueden llevar a sus mascotas a bordo, así como personas ocupadas que desatienden la alimentación de sus mascotas.</a:t>
-            </a:r>
-          </a:p>
-          <a:p>
-            <a:pPr algn="just"/>
-            <a:endParaRPr lang="es-MX" sz="1200" dirty="0">
-              <a:latin typeface="Century Gothic" panose="020B0502020202020204" pitchFamily="34" charset="0"/>
-            </a:endParaRPr>
-          </a:p>
-          <a:p>
-            <a:pPr algn="just"/>
-            <a:endParaRPr lang="es-MX" sz="1200" dirty="0">
-              <a:latin typeface="Century Gothic" panose="020B0502020202020204" pitchFamily="34" charset="0"/>
-            </a:endParaRPr>
-          </a:p>
-          <a:p>
-            <a:pPr algn="just"/>
+              <a:t>Se requerirá de una alianza con Meragro, ubicada en la ciudad de Tuxtla Gutiérrez, ya que es una de las empresas líderes en el área veterinaria, para dar a conocer nuestros productos e impulsar ventas.</a:t>
+            </a:r>
+          </a:p>
+          <a:p>
+            <a:pPr algn="ctr"/>
             <a:r>
               <a:rPr lang="es-MX" sz="1200" dirty="0">
                 <a:latin typeface="Century Gothic" panose="020B0502020202020204" pitchFamily="34" charset="0"/>
               </a:rPr>
-              <a:t>Así mismo, el collar está pensado para cualquier persona que quiera tener seguridad en caso de perder a su mascota.</a:t>
-            </a:r>
-          </a:p>
-        </p:txBody>
-      </p:sp>
-      <p:sp>
-        <p:nvSpPr>
-          <p:cNvPr id="18" name="TextBox 17">
-            <a:extLst>
-              <a:ext uri="{FF2B5EF4-FFF2-40B4-BE49-F238E27FC236}">
-                <a16:creationId xmlns:a16="http://schemas.microsoft.com/office/drawing/2014/main" id="{CBEA1268-4F03-484C-BF36-ED5D87CB29EE}"/>
+              <a:t>También tendremos proveedores para los diferentes componentes de los productos y requeriremos del uso de los servicios de paquetería de Estafeta, DHL o FedEx.</a:t>
+            </a:r>
+          </a:p>
+        </p:txBody>
+      </p:sp>
+      <p:sp>
+        <p:nvSpPr>
+          <p:cNvPr id="28" name="TextBox 27">
+            <a:extLst>
+              <a:ext uri="{FF2B5EF4-FFF2-40B4-BE49-F238E27FC236}">
+                <a16:creationId xmlns:a16="http://schemas.microsoft.com/office/drawing/2014/main" id="{6FFA094B-F740-4CA8-B05C-58C8E7400FF0}"/>
               </a:ext>
             </a:extLst>
           </p:cNvPr>
@@ -4252,8 +4619,8 @@
         </p:nvSpPr>
         <p:spPr>
           <a:xfrm>
-            <a:off x="7299846" y="2394985"/>
-            <a:ext cx="2115403" cy="584775"/>
+            <a:off x="2938948" y="444138"/>
+            <a:ext cx="2115403" cy="338554"/>
           </a:xfrm>
           <a:prstGeom prst="rect">
             <a:avLst/>
@@ -4268,25 +4635,23 @@
           <a:p>
             <a:pPr algn="ctr"/>
             <a:r>
-              <a:rPr lang="es-MX" sz="1600" dirty="0">
+              <a:rPr lang="es-MX" sz="1600" b="1" dirty="0">
                 <a:solidFill>
-                  <a:schemeClr val="accent1">
-                    <a:lumMod val="50000"/>
-                  </a:schemeClr>
+                  <a:schemeClr val="accent2"/>
                 </a:solidFill>
                 <a:latin typeface="Century Gothic" panose="020B0502020202020204" pitchFamily="34" charset="0"/>
               </a:rPr>
-              <a:t>Canales de comunicación</a:t>
-            </a:r>
-          </a:p>
-        </p:txBody>
-      </p:sp>
-      <p:sp>
-        <p:nvSpPr>
-          <p:cNvPr id="19" name="TextBox 18">
-            <a:extLst>
-              <a:ext uri="{FF2B5EF4-FFF2-40B4-BE49-F238E27FC236}">
-                <a16:creationId xmlns:a16="http://schemas.microsoft.com/office/drawing/2014/main" id="{7029AA6B-2CA1-4FEE-8775-D4ED7F2A9FD1}"/>
+              <a:t>Actividades clave</a:t>
+            </a:r>
+          </a:p>
+        </p:txBody>
+      </p:sp>
+      <p:sp>
+        <p:nvSpPr>
+          <p:cNvPr id="29" name="TextBox 28">
+            <a:extLst>
+              <a:ext uri="{FF2B5EF4-FFF2-40B4-BE49-F238E27FC236}">
+                <a16:creationId xmlns:a16="http://schemas.microsoft.com/office/drawing/2014/main" id="{F41C2601-BADE-42A1-8F14-844D20400F8C}"/>
               </a:ext>
             </a:extLst>
           </p:cNvPr>
@@ -4295,8 +4660,8 @@
         </p:nvSpPr>
         <p:spPr>
           <a:xfrm>
-            <a:off x="7398508" y="3183266"/>
-            <a:ext cx="1855528" cy="1015663"/>
+            <a:off x="2939764" y="819001"/>
+            <a:ext cx="2105878" cy="2139047"/>
           </a:xfrm>
           <a:prstGeom prst="rect">
             <a:avLst/>
@@ -4309,22 +4674,55 @@
           </a:bodyPr>
           <a:lstStyle/>
           <a:p>
-            <a:pPr algn="just"/>
-            <a:r>
-              <a:rPr lang="es-MX" sz="1200" dirty="0">
+            <a:pPr algn="ctr"/>
+            <a:r>
+              <a:rPr lang="es-MX" sz="1100" dirty="0">
                 <a:latin typeface="Century Gothic" panose="020B0502020202020204" pitchFamily="34" charset="0"/>
               </a:rPr>
-              <a:t>Podrán comprar directamente en nuestro sitio web, las entregas se realizarán por paquetería.</a:t>
-            </a:r>
-          </a:p>
-        </p:txBody>
-      </p:sp>
-      <p:sp>
-        <p:nvSpPr>
-          <p:cNvPr id="20" name="TextBox 19">
-            <a:extLst>
-              <a:ext uri="{FF2B5EF4-FFF2-40B4-BE49-F238E27FC236}">
-                <a16:creationId xmlns:a16="http://schemas.microsoft.com/office/drawing/2014/main" id="{338DDC51-2182-42F5-B73D-F908F81FF5B5}"/>
+              <a:t>Investigación exhaustiva para el desarrollo de los productos.</a:t>
+            </a:r>
+          </a:p>
+          <a:p>
+            <a:pPr algn="ctr"/>
+            <a:r>
+              <a:rPr lang="es-MX" sz="1100" dirty="0">
+                <a:latin typeface="Century Gothic" panose="020B0502020202020204" pitchFamily="34" charset="0"/>
+              </a:rPr>
+              <a:t>Localización de los proveedores y socios.</a:t>
+            </a:r>
+          </a:p>
+          <a:p>
+            <a:pPr algn="ctr"/>
+            <a:r>
+              <a:rPr lang="es-MX" sz="1100" dirty="0">
+                <a:latin typeface="Century Gothic" panose="020B0502020202020204" pitchFamily="34" charset="0"/>
+              </a:rPr>
+              <a:t>Implementación de Marketing y estrategias de negocio y ventas.</a:t>
+            </a:r>
+          </a:p>
+          <a:p>
+            <a:pPr algn="ctr"/>
+            <a:r>
+              <a:rPr lang="es-MX" sz="1100" dirty="0">
+                <a:latin typeface="Century Gothic" panose="020B0502020202020204" pitchFamily="34" charset="0"/>
+              </a:rPr>
+              <a:t>Pruebas finales de calidad y satisfacción para garantizar una experiencia excelente.</a:t>
+            </a:r>
+          </a:p>
+          <a:p>
+            <a:pPr algn="ctr"/>
+            <a:endParaRPr lang="es-MX" sz="1200" dirty="0">
+              <a:latin typeface="Century Gothic" panose="020B0502020202020204" pitchFamily="34" charset="0"/>
+            </a:endParaRPr>
+          </a:p>
+        </p:txBody>
+      </p:sp>
+      <p:sp>
+        <p:nvSpPr>
+          <p:cNvPr id="30" name="TextBox 29">
+            <a:extLst>
+              <a:ext uri="{FF2B5EF4-FFF2-40B4-BE49-F238E27FC236}">
+                <a16:creationId xmlns:a16="http://schemas.microsoft.com/office/drawing/2014/main" id="{83576ED5-4A72-4811-B055-25ECA1B0DEB3}"/>
               </a:ext>
             </a:extLst>
           </p:cNvPr>
@@ -4333,8 +4731,8 @@
         </p:nvSpPr>
         <p:spPr>
           <a:xfrm>
-            <a:off x="7317474" y="-26836"/>
-            <a:ext cx="2115403" cy="584775"/>
+            <a:off x="826603" y="5238963"/>
+            <a:ext cx="5171889" cy="338554"/>
           </a:xfrm>
           <a:prstGeom prst="rect">
             <a:avLst/>
@@ -4349,25 +4747,23 @@
           <a:p>
             <a:pPr algn="ctr"/>
             <a:r>
-              <a:rPr lang="es-MX" sz="1600" dirty="0">
+              <a:rPr lang="es-MX" sz="1600" b="1" dirty="0">
                 <a:solidFill>
-                  <a:schemeClr val="accent1">
-                    <a:lumMod val="50000"/>
-                  </a:schemeClr>
+                  <a:schemeClr val="accent2"/>
                 </a:solidFill>
                 <a:latin typeface="Century Gothic" panose="020B0502020202020204" pitchFamily="34" charset="0"/>
               </a:rPr>
-              <a:t>Relación con el cliente</a:t>
-            </a:r>
-          </a:p>
-        </p:txBody>
-      </p:sp>
-      <p:sp>
-        <p:nvSpPr>
-          <p:cNvPr id="21" name="TextBox 20">
-            <a:extLst>
-              <a:ext uri="{FF2B5EF4-FFF2-40B4-BE49-F238E27FC236}">
-                <a16:creationId xmlns:a16="http://schemas.microsoft.com/office/drawing/2014/main" id="{B425887D-1C27-4332-8EE2-9A06F37296BE}"/>
+              <a:t>Estructura de costes</a:t>
+            </a:r>
+          </a:p>
+        </p:txBody>
+      </p:sp>
+      <p:sp>
+        <p:nvSpPr>
+          <p:cNvPr id="31" name="TextBox 30">
+            <a:extLst>
+              <a:ext uri="{FF2B5EF4-FFF2-40B4-BE49-F238E27FC236}">
+                <a16:creationId xmlns:a16="http://schemas.microsoft.com/office/drawing/2014/main" id="{D99585C4-54A7-4754-98EC-E5D648C10426}"/>
               </a:ext>
             </a:extLst>
           </p:cNvPr>
@@ -4376,8 +4772,8 @@
         </p:nvSpPr>
         <p:spPr>
           <a:xfrm>
-            <a:off x="7416136" y="761445"/>
-            <a:ext cx="1855528" cy="276999"/>
+            <a:off x="807842" y="5779677"/>
+            <a:ext cx="5181932" cy="646331"/>
           </a:xfrm>
           <a:prstGeom prst="rect">
             <a:avLst/>
@@ -4390,436 +4786,13 @@
           </a:bodyPr>
           <a:lstStyle/>
           <a:p>
-            <a:pPr algn="just"/>
-            <a:r>
-              <a:rPr lang="es-MX" sz="1200" dirty="0" err="1">
-                <a:latin typeface="Century Gothic" panose="020B0502020202020204" pitchFamily="34" charset="0"/>
-              </a:rPr>
-              <a:t>null</a:t>
-            </a:r>
-            <a:endParaRPr lang="es-MX" sz="1200" dirty="0">
-              <a:latin typeface="Century Gothic" panose="020B0502020202020204" pitchFamily="34" charset="0"/>
-            </a:endParaRPr>
-          </a:p>
-        </p:txBody>
-      </p:sp>
-      <p:sp>
-        <p:nvSpPr>
-          <p:cNvPr id="22" name="TextBox 21">
-            <a:extLst>
-              <a:ext uri="{FF2B5EF4-FFF2-40B4-BE49-F238E27FC236}">
-                <a16:creationId xmlns:a16="http://schemas.microsoft.com/office/drawing/2014/main" id="{DA76E01B-B50F-40E0-BDC3-E9B750A87EBB}"/>
-              </a:ext>
-            </a:extLst>
-          </p:cNvPr>
-          <p:cNvSpPr txBox="1"/>
-          <p:nvPr/>
-        </p:nvSpPr>
-        <p:spPr>
-          <a:xfrm>
-            <a:off x="5835413" y="4750764"/>
-            <a:ext cx="2115403" cy="584775"/>
-          </a:xfrm>
-          <a:prstGeom prst="rect">
-            <a:avLst/>
-          </a:prstGeom>
-          <a:noFill/>
-        </p:spPr>
-        <p:txBody>
-          <a:bodyPr wrap="square" rtlCol="0">
-            <a:spAutoFit/>
-          </a:bodyPr>
-          <a:lstStyle/>
-          <a:p>
             <a:pPr algn="ctr"/>
-            <a:r>
-              <a:rPr lang="es-MX" sz="1600" dirty="0">
-                <a:solidFill>
-                  <a:schemeClr val="accent1">
-                    <a:lumMod val="50000"/>
-                  </a:schemeClr>
-                </a:solidFill>
-                <a:latin typeface="Century Gothic" panose="020B0502020202020204" pitchFamily="34" charset="0"/>
-              </a:rPr>
-              <a:t>Canales de comunicación</a:t>
-            </a:r>
-          </a:p>
-        </p:txBody>
-      </p:sp>
-      <p:sp>
-        <p:nvSpPr>
-          <p:cNvPr id="23" name="TextBox 22">
-            <a:extLst>
-              <a:ext uri="{FF2B5EF4-FFF2-40B4-BE49-F238E27FC236}">
-                <a16:creationId xmlns:a16="http://schemas.microsoft.com/office/drawing/2014/main" id="{C9C5B57C-CE28-4BF7-8095-ED24D16A3EB2}"/>
-              </a:ext>
-            </a:extLst>
-          </p:cNvPr>
-          <p:cNvSpPr txBox="1"/>
-          <p:nvPr/>
-        </p:nvSpPr>
-        <p:spPr>
-          <a:xfrm>
-            <a:off x="7618323" y="5241043"/>
-            <a:ext cx="3661333" cy="646331"/>
-          </a:xfrm>
-          <a:prstGeom prst="rect">
-            <a:avLst/>
-          </a:prstGeom>
-          <a:noFill/>
-        </p:spPr>
-        <p:txBody>
-          <a:bodyPr wrap="square" rtlCol="0">
-            <a:spAutoFit/>
-          </a:bodyPr>
-          <a:lstStyle/>
-          <a:p>
-            <a:pPr algn="just"/>
             <a:r>
               <a:rPr lang="es-MX" sz="1200" dirty="0">
                 <a:latin typeface="Century Gothic" panose="020B0502020202020204" pitchFamily="34" charset="0"/>
               </a:rPr>
-              <a:t>Anunciaremos nuestros productos con veterinarias locales e invirtiendo en publicidad con redes sociales como Facebook y Twitter.</a:t>
-            </a:r>
-          </a:p>
-        </p:txBody>
-      </p:sp>
-      <p:sp>
-        <p:nvSpPr>
-          <p:cNvPr id="24" name="TextBox 23">
-            <a:extLst>
-              <a:ext uri="{FF2B5EF4-FFF2-40B4-BE49-F238E27FC236}">
-                <a16:creationId xmlns:a16="http://schemas.microsoft.com/office/drawing/2014/main" id="{D813653D-C91A-48A2-8F27-2A3AA927E68B}"/>
-              </a:ext>
-            </a:extLst>
-          </p:cNvPr>
-          <p:cNvSpPr txBox="1"/>
-          <p:nvPr/>
-        </p:nvSpPr>
-        <p:spPr>
-          <a:xfrm>
-            <a:off x="3089937" y="2427787"/>
-            <a:ext cx="2115403" cy="338554"/>
-          </a:xfrm>
-          <a:prstGeom prst="rect">
-            <a:avLst/>
-          </a:prstGeom>
-          <a:noFill/>
-        </p:spPr>
-        <p:txBody>
-          <a:bodyPr wrap="square" rtlCol="0">
-            <a:spAutoFit/>
-          </a:bodyPr>
-          <a:lstStyle/>
-          <a:p>
-            <a:pPr algn="ctr"/>
-            <a:r>
-              <a:rPr lang="es-MX" sz="1600" dirty="0">
-                <a:solidFill>
-                  <a:schemeClr val="accent1">
-                    <a:lumMod val="50000"/>
-                  </a:schemeClr>
-                </a:solidFill>
-                <a:latin typeface="Century Gothic" panose="020B0502020202020204" pitchFamily="34" charset="0"/>
-              </a:rPr>
-              <a:t>Recursos clave</a:t>
-            </a:r>
-          </a:p>
-        </p:txBody>
-      </p:sp>
-      <p:sp>
-        <p:nvSpPr>
-          <p:cNvPr id="25" name="TextBox 24">
-            <a:extLst>
-              <a:ext uri="{FF2B5EF4-FFF2-40B4-BE49-F238E27FC236}">
-                <a16:creationId xmlns:a16="http://schemas.microsoft.com/office/drawing/2014/main" id="{83AB05C1-4ACB-4401-BDA1-8B4DEC9E40EC}"/>
-              </a:ext>
-            </a:extLst>
-          </p:cNvPr>
-          <p:cNvSpPr txBox="1"/>
-          <p:nvPr/>
-        </p:nvSpPr>
-        <p:spPr>
-          <a:xfrm>
-            <a:off x="3188599" y="3216068"/>
-            <a:ext cx="1855528" cy="1015663"/>
-          </a:xfrm>
-          <a:prstGeom prst="rect">
-            <a:avLst/>
-          </a:prstGeom>
-          <a:noFill/>
-        </p:spPr>
-        <p:txBody>
-          <a:bodyPr wrap="square" rtlCol="0">
-            <a:spAutoFit/>
-          </a:bodyPr>
-          <a:lstStyle/>
-          <a:p>
-            <a:pPr algn="just"/>
-            <a:r>
-              <a:rPr lang="es-MX" sz="1200" dirty="0">
-                <a:latin typeface="Century Gothic" panose="020B0502020202020204" pitchFamily="34" charset="0"/>
-              </a:rPr>
-              <a:t>Se requiere de un equipo de desarrolladores, equipos de cómputo …. Agrega más :v</a:t>
-            </a:r>
-          </a:p>
-        </p:txBody>
-      </p:sp>
-      <p:sp>
-        <p:nvSpPr>
-          <p:cNvPr id="26" name="TextBox 25">
-            <a:extLst>
-              <a:ext uri="{FF2B5EF4-FFF2-40B4-BE49-F238E27FC236}">
-                <a16:creationId xmlns:a16="http://schemas.microsoft.com/office/drawing/2014/main" id="{4CF5A6C1-F0BA-4249-AB57-98E7A23749B4}"/>
-              </a:ext>
-            </a:extLst>
-          </p:cNvPr>
-          <p:cNvSpPr txBox="1"/>
-          <p:nvPr/>
-        </p:nvSpPr>
-        <p:spPr>
-          <a:xfrm>
-            <a:off x="972227" y="-4549"/>
-            <a:ext cx="2115403" cy="338554"/>
-          </a:xfrm>
-          <a:prstGeom prst="rect">
-            <a:avLst/>
-          </a:prstGeom>
-          <a:noFill/>
-        </p:spPr>
-        <p:txBody>
-          <a:bodyPr wrap="square" rtlCol="0">
-            <a:spAutoFit/>
-          </a:bodyPr>
-          <a:lstStyle/>
-          <a:p>
-            <a:pPr algn="ctr"/>
-            <a:r>
-              <a:rPr lang="es-MX" sz="1600" dirty="0">
-                <a:solidFill>
-                  <a:schemeClr val="accent1">
-                    <a:lumMod val="50000"/>
-                  </a:schemeClr>
-                </a:solidFill>
-                <a:latin typeface="Century Gothic" panose="020B0502020202020204" pitchFamily="34" charset="0"/>
-              </a:rPr>
-              <a:t>Socios clave</a:t>
-            </a:r>
-          </a:p>
-        </p:txBody>
-      </p:sp>
-      <p:sp>
-        <p:nvSpPr>
-          <p:cNvPr id="27" name="TextBox 26">
-            <a:extLst>
-              <a:ext uri="{FF2B5EF4-FFF2-40B4-BE49-F238E27FC236}">
-                <a16:creationId xmlns:a16="http://schemas.microsoft.com/office/drawing/2014/main" id="{3798F32A-0000-4CB1-B1C5-685C36B2BBD3}"/>
-              </a:ext>
-            </a:extLst>
-          </p:cNvPr>
-          <p:cNvSpPr txBox="1"/>
-          <p:nvPr/>
-        </p:nvSpPr>
-        <p:spPr>
-          <a:xfrm>
-            <a:off x="1056531" y="590124"/>
-            <a:ext cx="1885950" cy="1569660"/>
-          </a:xfrm>
-          <a:prstGeom prst="rect">
-            <a:avLst/>
-          </a:prstGeom>
-          <a:noFill/>
-        </p:spPr>
-        <p:txBody>
-          <a:bodyPr wrap="square" rtlCol="0">
-            <a:spAutoFit/>
-          </a:bodyPr>
-          <a:lstStyle/>
-          <a:p>
-            <a:pPr algn="just"/>
-            <a:r>
-              <a:rPr lang="es-MX" sz="1200" dirty="0">
-                <a:latin typeface="Century Gothic" panose="020B0502020202020204" pitchFamily="34" charset="0"/>
-              </a:rPr>
-              <a:t>Se requerirá de una alianza con </a:t>
-            </a:r>
-            <a:r>
-              <a:rPr lang="es-MX" sz="1200" dirty="0" err="1">
-                <a:latin typeface="Century Gothic" panose="020B0502020202020204" pitchFamily="34" charset="0"/>
-              </a:rPr>
-              <a:t>Meragro</a:t>
-            </a:r>
-            <a:r>
-              <a:rPr lang="es-MX" sz="1200" dirty="0">
-                <a:latin typeface="Century Gothic" panose="020B0502020202020204" pitchFamily="34" charset="0"/>
-              </a:rPr>
-              <a:t>, ya que es una de las empresas líderes en el área veterinaria para dar a conocer nuestra marca e impulsar ventas.</a:t>
-            </a:r>
-          </a:p>
-        </p:txBody>
-      </p:sp>
-      <p:sp>
-        <p:nvSpPr>
-          <p:cNvPr id="28" name="TextBox 27">
-            <a:extLst>
-              <a:ext uri="{FF2B5EF4-FFF2-40B4-BE49-F238E27FC236}">
-                <a16:creationId xmlns:a16="http://schemas.microsoft.com/office/drawing/2014/main" id="{6FFA094B-F740-4CA8-B05C-58C8E7400FF0}"/>
-              </a:ext>
-            </a:extLst>
-          </p:cNvPr>
-          <p:cNvSpPr txBox="1"/>
-          <p:nvPr/>
-        </p:nvSpPr>
-        <p:spPr>
-          <a:xfrm>
-            <a:off x="3043451" y="0"/>
-            <a:ext cx="2115403" cy="338554"/>
-          </a:xfrm>
-          <a:prstGeom prst="rect">
-            <a:avLst/>
-          </a:prstGeom>
-          <a:noFill/>
-        </p:spPr>
-        <p:txBody>
-          <a:bodyPr wrap="square" rtlCol="0">
-            <a:spAutoFit/>
-          </a:bodyPr>
-          <a:lstStyle/>
-          <a:p>
-            <a:pPr algn="ctr"/>
-            <a:r>
-              <a:rPr lang="es-MX" sz="1600" dirty="0">
-                <a:solidFill>
-                  <a:schemeClr val="accent1">
-                    <a:lumMod val="50000"/>
-                  </a:schemeClr>
-                </a:solidFill>
-                <a:latin typeface="Century Gothic" panose="020B0502020202020204" pitchFamily="34" charset="0"/>
-              </a:rPr>
-              <a:t>Actividades clave</a:t>
-            </a:r>
-          </a:p>
-        </p:txBody>
-      </p:sp>
-      <p:sp>
-        <p:nvSpPr>
-          <p:cNvPr id="29" name="TextBox 28">
-            <a:extLst>
-              <a:ext uri="{FF2B5EF4-FFF2-40B4-BE49-F238E27FC236}">
-                <a16:creationId xmlns:a16="http://schemas.microsoft.com/office/drawing/2014/main" id="{F41C2601-BADE-42A1-8F14-844D20400F8C}"/>
-              </a:ext>
-            </a:extLst>
-          </p:cNvPr>
-          <p:cNvSpPr txBox="1"/>
-          <p:nvPr/>
-        </p:nvSpPr>
-        <p:spPr>
-          <a:xfrm>
-            <a:off x="3142473" y="570572"/>
-            <a:ext cx="1855528" cy="1569660"/>
-          </a:xfrm>
-          <a:prstGeom prst="rect">
-            <a:avLst/>
-          </a:prstGeom>
-          <a:noFill/>
-        </p:spPr>
-        <p:txBody>
-          <a:bodyPr wrap="square" rtlCol="0">
-            <a:spAutoFit/>
-          </a:bodyPr>
-          <a:lstStyle/>
-          <a:p>
-            <a:pPr algn="just"/>
-            <a:r>
-              <a:rPr lang="es-MX" sz="1200" dirty="0">
-                <a:latin typeface="Century Gothic" panose="020B0502020202020204" pitchFamily="34" charset="0"/>
-              </a:rPr>
-              <a:t>Investigación exhaustiva para el desarrollo de los productos, así como pruebas de calidad para garantizar una experiencia agradable.</a:t>
-            </a:r>
-          </a:p>
-        </p:txBody>
-      </p:sp>
-      <p:sp>
-        <p:nvSpPr>
-          <p:cNvPr id="30" name="TextBox 29">
-            <a:extLst>
-              <a:ext uri="{FF2B5EF4-FFF2-40B4-BE49-F238E27FC236}">
-                <a16:creationId xmlns:a16="http://schemas.microsoft.com/office/drawing/2014/main" id="{83576ED5-4A72-4811-B055-25ECA1B0DEB3}"/>
-              </a:ext>
-            </a:extLst>
-          </p:cNvPr>
-          <p:cNvSpPr txBox="1"/>
-          <p:nvPr/>
-        </p:nvSpPr>
-        <p:spPr>
-          <a:xfrm>
-            <a:off x="635490" y="4783530"/>
-            <a:ext cx="2115403" cy="584775"/>
-          </a:xfrm>
-          <a:prstGeom prst="rect">
-            <a:avLst/>
-          </a:prstGeom>
-          <a:noFill/>
-        </p:spPr>
-        <p:txBody>
-          <a:bodyPr wrap="square" rtlCol="0">
-            <a:spAutoFit/>
-          </a:bodyPr>
-          <a:lstStyle/>
-          <a:p>
-            <a:pPr algn="ctr"/>
-            <a:r>
-              <a:rPr lang="es-MX" sz="1600" dirty="0">
-                <a:solidFill>
-                  <a:schemeClr val="accent1">
-                    <a:lumMod val="50000"/>
-                  </a:schemeClr>
-                </a:solidFill>
-                <a:latin typeface="Century Gothic" panose="020B0502020202020204" pitchFamily="34" charset="0"/>
-              </a:rPr>
-              <a:t>Estructura de costes</a:t>
-            </a:r>
-          </a:p>
-        </p:txBody>
-      </p:sp>
-      <p:sp>
-        <p:nvSpPr>
-          <p:cNvPr id="31" name="TextBox 30">
-            <a:extLst>
-              <a:ext uri="{FF2B5EF4-FFF2-40B4-BE49-F238E27FC236}">
-                <a16:creationId xmlns:a16="http://schemas.microsoft.com/office/drawing/2014/main" id="{D99585C4-54A7-4754-98EC-E5D648C10426}"/>
-              </a:ext>
-            </a:extLst>
-          </p:cNvPr>
-          <p:cNvSpPr txBox="1"/>
-          <p:nvPr/>
-        </p:nvSpPr>
-        <p:spPr>
-          <a:xfrm>
-            <a:off x="2432943" y="5335539"/>
-            <a:ext cx="3661333" cy="276999"/>
-          </a:xfrm>
-          <a:prstGeom prst="rect">
-            <a:avLst/>
-          </a:prstGeom>
-          <a:noFill/>
-        </p:spPr>
-        <p:txBody>
-          <a:bodyPr wrap="square" rtlCol="0">
-            <a:spAutoFit/>
-          </a:bodyPr>
-          <a:lstStyle/>
-          <a:p>
-            <a:pPr algn="just"/>
-            <a:r>
-              <a:rPr lang="es-MX" sz="1200" dirty="0" err="1">
-                <a:latin typeface="Century Gothic" panose="020B0502020202020204" pitchFamily="34" charset="0"/>
-              </a:rPr>
-              <a:t>null</a:t>
-            </a:r>
-            <a:endParaRPr lang="es-MX" sz="1200" dirty="0">
-              <a:latin typeface="Century Gothic" panose="020B0502020202020204" pitchFamily="34" charset="0"/>
-            </a:endParaRPr>
+              <a:t>Haciendo una estimación de costes generales para el desarrollo y producción de nuestras dos líneas de productos, calculamos un total de $60’000</a:t>
+            </a:r>
           </a:p>
         </p:txBody>
       </p:sp>

</xml_diff>